<commit_message>
Update HTTP Cookie Session
</commit_message>
<xml_diff>
--- a/images/theory_analysis/HTTP_Cookie_Session/HTTP_Cookie_Session.pptx
+++ b/images/theory_analysis/HTTP_Cookie_Session/HTTP_Cookie_Session.pptx
@@ -110,7 +110,7 @@
   </p:defaultTextStyle>
   <p:extLst>
     <p:ext uri="{EFAFB233-063F-42B5-8137-9DF3F51BA10A}">
-      <p15:sldGuideLst xmlns:p15="http://schemas.microsoft.com/office/powerpoint/2012/main" xmlns="">
+      <p15:sldGuideLst xmlns:p15="http://schemas.microsoft.com/office/powerpoint/2012/main">
         <p15:guide id="1" orient="horz" pos="2160">
           <p15:clr>
             <a:srgbClr val="A4A3A4"/>
@@ -214,7 +214,7 @@
           <a:p>
             <a:fld id="{6CD5550B-26C4-49A9-A5BA-636EF7BE6CE9}" type="datetimeFigureOut">
               <a:rPr lang="ko-KR" altLang="en-US" smtClean="0"/>
-              <a:t>2018-05-09</a:t>
+              <a:t>2018-05-10</a:t>
             </a:fld>
             <a:endParaRPr lang="ko-KR" altLang="en-US"/>
           </a:p>
@@ -278,38 +278,37 @@
           <a:p>
             <a:pPr lvl="0"/>
             <a:r>
-              <a:rPr lang="ko-KR" altLang="en-US" smtClean="0"/>
+              <a:rPr lang="ko-KR" altLang="en-US"/>
               <a:t>마스터 텍스트 스타일을 편집합니다</a:t>
             </a:r>
           </a:p>
           <a:p>
             <a:pPr lvl="1"/>
             <a:r>
-              <a:rPr lang="ko-KR" altLang="en-US" smtClean="0"/>
+              <a:rPr lang="ko-KR" altLang="en-US"/>
               <a:t>둘째 수준</a:t>
             </a:r>
           </a:p>
           <a:p>
             <a:pPr lvl="2"/>
             <a:r>
-              <a:rPr lang="ko-KR" altLang="en-US" smtClean="0"/>
+              <a:rPr lang="ko-KR" altLang="en-US"/>
               <a:t>셋째 수준</a:t>
             </a:r>
           </a:p>
           <a:p>
             <a:pPr lvl="3"/>
             <a:r>
-              <a:rPr lang="ko-KR" altLang="en-US" smtClean="0"/>
+              <a:rPr lang="ko-KR" altLang="en-US"/>
               <a:t>넷째 수준</a:t>
             </a:r>
           </a:p>
           <a:p>
             <a:pPr lvl="4"/>
             <a:r>
-              <a:rPr lang="ko-KR" altLang="en-US" smtClean="0"/>
+              <a:rPr lang="ko-KR" altLang="en-US"/>
               <a:t>다섯째 수준</a:t>
             </a:r>
-            <a:endParaRPr lang="ko-KR" altLang="en-US"/>
           </a:p>
         </p:txBody>
       </p:sp>
@@ -520,10 +519,9 @@
           <a:lstStyle/>
           <a:p>
             <a:r>
-              <a:rPr lang="ko-KR" altLang="en-US" smtClean="0"/>
+              <a:rPr lang="ko-KR" altLang="en-US"/>
               <a:t>마스터 제목 스타일 편집</a:t>
             </a:r>
-            <a:endParaRPr lang="ko-KR" altLang="en-US"/>
           </a:p>
         </p:txBody>
       </p:sp>
@@ -639,10 +637,9 @@
           </a:lstStyle>
           <a:p>
             <a:r>
-              <a:rPr lang="ko-KR" altLang="en-US" smtClean="0"/>
+              <a:rPr lang="ko-KR" altLang="en-US"/>
               <a:t>마스터 부제목 스타일 편집</a:t>
             </a:r>
-            <a:endParaRPr lang="ko-KR" altLang="en-US"/>
           </a:p>
         </p:txBody>
       </p:sp>
@@ -663,7 +660,7 @@
           <a:p>
             <a:fld id="{FB30EDBD-1C2D-4C1E-B459-B60219FAB484}" type="datetimeFigureOut">
               <a:rPr lang="ko-KR" altLang="en-US" smtClean="0"/>
-              <a:t>2018-05-09</a:t>
+              <a:t>2018-05-10</a:t>
             </a:fld>
             <a:endParaRPr lang="ko-KR" altLang="en-US"/>
           </a:p>
@@ -752,10 +749,9 @@
           <a:lstStyle/>
           <a:p>
             <a:r>
-              <a:rPr lang="ko-KR" altLang="en-US" smtClean="0"/>
+              <a:rPr lang="ko-KR" altLang="en-US"/>
               <a:t>마스터 제목 스타일 편집</a:t>
             </a:r>
-            <a:endParaRPr lang="ko-KR" altLang="en-US"/>
           </a:p>
         </p:txBody>
       </p:sp>
@@ -776,38 +772,37 @@
           <a:p>
             <a:pPr lvl="0"/>
             <a:r>
-              <a:rPr lang="ko-KR" altLang="en-US" smtClean="0"/>
+              <a:rPr lang="ko-KR" altLang="en-US"/>
               <a:t>마스터 텍스트 스타일을 편집합니다</a:t>
             </a:r>
           </a:p>
           <a:p>
             <a:pPr lvl="1"/>
             <a:r>
-              <a:rPr lang="ko-KR" altLang="en-US" smtClean="0"/>
+              <a:rPr lang="ko-KR" altLang="en-US"/>
               <a:t>둘째 수준</a:t>
             </a:r>
           </a:p>
           <a:p>
             <a:pPr lvl="2"/>
             <a:r>
-              <a:rPr lang="ko-KR" altLang="en-US" smtClean="0"/>
+              <a:rPr lang="ko-KR" altLang="en-US"/>
               <a:t>셋째 수준</a:t>
             </a:r>
           </a:p>
           <a:p>
             <a:pPr lvl="3"/>
             <a:r>
-              <a:rPr lang="ko-KR" altLang="en-US" smtClean="0"/>
+              <a:rPr lang="ko-KR" altLang="en-US"/>
               <a:t>넷째 수준</a:t>
             </a:r>
           </a:p>
           <a:p>
             <a:pPr lvl="4"/>
             <a:r>
-              <a:rPr lang="ko-KR" altLang="en-US" smtClean="0"/>
+              <a:rPr lang="ko-KR" altLang="en-US"/>
               <a:t>다섯째 수준</a:t>
             </a:r>
-            <a:endParaRPr lang="ko-KR" altLang="en-US"/>
           </a:p>
         </p:txBody>
       </p:sp>
@@ -828,7 +823,7 @@
           <a:p>
             <a:fld id="{FB30EDBD-1C2D-4C1E-B459-B60219FAB484}" type="datetimeFigureOut">
               <a:rPr lang="ko-KR" altLang="en-US" smtClean="0"/>
-              <a:t>2018-05-09</a:t>
+              <a:t>2018-05-10</a:t>
             </a:fld>
             <a:endParaRPr lang="ko-KR" altLang="en-US"/>
           </a:p>
@@ -922,10 +917,9 @@
           <a:lstStyle/>
           <a:p>
             <a:r>
-              <a:rPr lang="ko-KR" altLang="en-US" smtClean="0"/>
+              <a:rPr lang="ko-KR" altLang="en-US"/>
               <a:t>마스터 제목 스타일 편집</a:t>
             </a:r>
-            <a:endParaRPr lang="ko-KR" altLang="en-US"/>
           </a:p>
         </p:txBody>
       </p:sp>
@@ -951,38 +945,37 @@
           <a:p>
             <a:pPr lvl="0"/>
             <a:r>
-              <a:rPr lang="ko-KR" altLang="en-US" smtClean="0"/>
+              <a:rPr lang="ko-KR" altLang="en-US"/>
               <a:t>마스터 텍스트 스타일을 편집합니다</a:t>
             </a:r>
           </a:p>
           <a:p>
             <a:pPr lvl="1"/>
             <a:r>
-              <a:rPr lang="ko-KR" altLang="en-US" smtClean="0"/>
+              <a:rPr lang="ko-KR" altLang="en-US"/>
               <a:t>둘째 수준</a:t>
             </a:r>
           </a:p>
           <a:p>
             <a:pPr lvl="2"/>
             <a:r>
-              <a:rPr lang="ko-KR" altLang="en-US" smtClean="0"/>
+              <a:rPr lang="ko-KR" altLang="en-US"/>
               <a:t>셋째 수준</a:t>
             </a:r>
           </a:p>
           <a:p>
             <a:pPr lvl="3"/>
             <a:r>
-              <a:rPr lang="ko-KR" altLang="en-US" smtClean="0"/>
+              <a:rPr lang="ko-KR" altLang="en-US"/>
               <a:t>넷째 수준</a:t>
             </a:r>
           </a:p>
           <a:p>
             <a:pPr lvl="4"/>
             <a:r>
-              <a:rPr lang="ko-KR" altLang="en-US" smtClean="0"/>
+              <a:rPr lang="ko-KR" altLang="en-US"/>
               <a:t>다섯째 수준</a:t>
             </a:r>
-            <a:endParaRPr lang="ko-KR" altLang="en-US"/>
           </a:p>
         </p:txBody>
       </p:sp>
@@ -1003,7 +996,7 @@
           <a:p>
             <a:fld id="{FB30EDBD-1C2D-4C1E-B459-B60219FAB484}" type="datetimeFigureOut">
               <a:rPr lang="ko-KR" altLang="en-US" smtClean="0"/>
-              <a:t>2018-05-09</a:t>
+              <a:t>2018-05-10</a:t>
             </a:fld>
             <a:endParaRPr lang="ko-KR" altLang="en-US"/>
           </a:p>
@@ -1092,10 +1085,9 @@
           <a:lstStyle/>
           <a:p>
             <a:r>
-              <a:rPr lang="ko-KR" altLang="en-US" smtClean="0"/>
+              <a:rPr lang="ko-KR" altLang="en-US"/>
               <a:t>마스터 제목 스타일 편집</a:t>
             </a:r>
-            <a:endParaRPr lang="ko-KR" altLang="en-US"/>
           </a:p>
         </p:txBody>
       </p:sp>
@@ -1116,38 +1108,37 @@
           <a:p>
             <a:pPr lvl="0"/>
             <a:r>
-              <a:rPr lang="ko-KR" altLang="en-US" smtClean="0"/>
+              <a:rPr lang="ko-KR" altLang="en-US"/>
               <a:t>마스터 텍스트 스타일을 편집합니다</a:t>
             </a:r>
           </a:p>
           <a:p>
             <a:pPr lvl="1"/>
             <a:r>
-              <a:rPr lang="ko-KR" altLang="en-US" smtClean="0"/>
+              <a:rPr lang="ko-KR" altLang="en-US"/>
               <a:t>둘째 수준</a:t>
             </a:r>
           </a:p>
           <a:p>
             <a:pPr lvl="2"/>
             <a:r>
-              <a:rPr lang="ko-KR" altLang="en-US" smtClean="0"/>
+              <a:rPr lang="ko-KR" altLang="en-US"/>
               <a:t>셋째 수준</a:t>
             </a:r>
           </a:p>
           <a:p>
             <a:pPr lvl="3"/>
             <a:r>
-              <a:rPr lang="ko-KR" altLang="en-US" smtClean="0"/>
+              <a:rPr lang="ko-KR" altLang="en-US"/>
               <a:t>넷째 수준</a:t>
             </a:r>
           </a:p>
           <a:p>
             <a:pPr lvl="4"/>
             <a:r>
-              <a:rPr lang="ko-KR" altLang="en-US" smtClean="0"/>
+              <a:rPr lang="ko-KR" altLang="en-US"/>
               <a:t>다섯째 수준</a:t>
             </a:r>
-            <a:endParaRPr lang="ko-KR" altLang="en-US"/>
           </a:p>
         </p:txBody>
       </p:sp>
@@ -1168,7 +1159,7 @@
           <a:p>
             <a:fld id="{FB30EDBD-1C2D-4C1E-B459-B60219FAB484}" type="datetimeFigureOut">
               <a:rPr lang="ko-KR" altLang="en-US" smtClean="0"/>
-              <a:t>2018-05-09</a:t>
+              <a:t>2018-05-10</a:t>
             </a:fld>
             <a:endParaRPr lang="ko-KR" altLang="en-US"/>
           </a:p>
@@ -1221,13 +1212,6 @@
   <p:clrMapOvr>
     <a:masterClrMapping/>
   </p:clrMapOvr>
-  <p:timing>
-    <p:tnLst>
-      <p:par>
-        <p:cTn id="1" dur="indefinite" restart="never" nodeType="tmRoot"/>
-      </p:par>
-    </p:tnLst>
-  </p:timing>
 </p:sldLayout>
 </file>
 
@@ -1273,10 +1257,9 @@
           </a:lstStyle>
           <a:p>
             <a:r>
-              <a:rPr lang="ko-KR" altLang="en-US" smtClean="0"/>
+              <a:rPr lang="ko-KR" altLang="en-US"/>
               <a:t>마스터 제목 스타일 편집</a:t>
             </a:r>
-            <a:endParaRPr lang="ko-KR" altLang="en-US"/>
           </a:p>
         </p:txBody>
       </p:sp>
@@ -1393,7 +1376,7 @@
           <a:p>
             <a:pPr lvl="0"/>
             <a:r>
-              <a:rPr lang="ko-KR" altLang="en-US" smtClean="0"/>
+              <a:rPr lang="ko-KR" altLang="en-US"/>
               <a:t>마스터 텍스트 스타일을 편집합니다</a:t>
             </a:r>
           </a:p>
@@ -1416,7 +1399,7 @@
           <a:p>
             <a:fld id="{FB30EDBD-1C2D-4C1E-B459-B60219FAB484}" type="datetimeFigureOut">
               <a:rPr lang="ko-KR" altLang="en-US" smtClean="0"/>
-              <a:t>2018-05-09</a:t>
+              <a:t>2018-05-10</a:t>
             </a:fld>
             <a:endParaRPr lang="ko-KR" altLang="en-US"/>
           </a:p>
@@ -1505,10 +1488,9 @@
           <a:lstStyle/>
           <a:p>
             <a:r>
-              <a:rPr lang="ko-KR" altLang="en-US" smtClean="0"/>
+              <a:rPr lang="ko-KR" altLang="en-US"/>
               <a:t>마스터 제목 스타일 편집</a:t>
             </a:r>
-            <a:endParaRPr lang="ko-KR" altLang="en-US"/>
           </a:p>
         </p:txBody>
       </p:sp>
@@ -1562,38 +1544,37 @@
           <a:p>
             <a:pPr lvl="0"/>
             <a:r>
-              <a:rPr lang="ko-KR" altLang="en-US" smtClean="0"/>
+              <a:rPr lang="ko-KR" altLang="en-US"/>
               <a:t>마스터 텍스트 스타일을 편집합니다</a:t>
             </a:r>
           </a:p>
           <a:p>
             <a:pPr lvl="1"/>
             <a:r>
-              <a:rPr lang="ko-KR" altLang="en-US" smtClean="0"/>
+              <a:rPr lang="ko-KR" altLang="en-US"/>
               <a:t>둘째 수준</a:t>
             </a:r>
           </a:p>
           <a:p>
             <a:pPr lvl="2"/>
             <a:r>
-              <a:rPr lang="ko-KR" altLang="en-US" smtClean="0"/>
+              <a:rPr lang="ko-KR" altLang="en-US"/>
               <a:t>셋째 수준</a:t>
             </a:r>
           </a:p>
           <a:p>
             <a:pPr lvl="3"/>
             <a:r>
-              <a:rPr lang="ko-KR" altLang="en-US" smtClean="0"/>
+              <a:rPr lang="ko-KR" altLang="en-US"/>
               <a:t>넷째 수준</a:t>
             </a:r>
           </a:p>
           <a:p>
             <a:pPr lvl="4"/>
             <a:r>
-              <a:rPr lang="ko-KR" altLang="en-US" smtClean="0"/>
+              <a:rPr lang="ko-KR" altLang="en-US"/>
               <a:t>다섯째 수준</a:t>
             </a:r>
-            <a:endParaRPr lang="ko-KR" altLang="en-US"/>
           </a:p>
         </p:txBody>
       </p:sp>
@@ -1647,38 +1628,37 @@
           <a:p>
             <a:pPr lvl="0"/>
             <a:r>
-              <a:rPr lang="ko-KR" altLang="en-US" smtClean="0"/>
+              <a:rPr lang="ko-KR" altLang="en-US"/>
               <a:t>마스터 텍스트 스타일을 편집합니다</a:t>
             </a:r>
           </a:p>
           <a:p>
             <a:pPr lvl="1"/>
             <a:r>
-              <a:rPr lang="ko-KR" altLang="en-US" smtClean="0"/>
+              <a:rPr lang="ko-KR" altLang="en-US"/>
               <a:t>둘째 수준</a:t>
             </a:r>
           </a:p>
           <a:p>
             <a:pPr lvl="2"/>
             <a:r>
-              <a:rPr lang="ko-KR" altLang="en-US" smtClean="0"/>
+              <a:rPr lang="ko-KR" altLang="en-US"/>
               <a:t>셋째 수준</a:t>
             </a:r>
           </a:p>
           <a:p>
             <a:pPr lvl="3"/>
             <a:r>
-              <a:rPr lang="ko-KR" altLang="en-US" smtClean="0"/>
+              <a:rPr lang="ko-KR" altLang="en-US"/>
               <a:t>넷째 수준</a:t>
             </a:r>
           </a:p>
           <a:p>
             <a:pPr lvl="4"/>
             <a:r>
-              <a:rPr lang="ko-KR" altLang="en-US" smtClean="0"/>
+              <a:rPr lang="ko-KR" altLang="en-US"/>
               <a:t>다섯째 수준</a:t>
             </a:r>
-            <a:endParaRPr lang="ko-KR" altLang="en-US"/>
           </a:p>
         </p:txBody>
       </p:sp>
@@ -1699,7 +1679,7 @@
           <a:p>
             <a:fld id="{FB30EDBD-1C2D-4C1E-B459-B60219FAB484}" type="datetimeFigureOut">
               <a:rPr lang="ko-KR" altLang="en-US" smtClean="0"/>
-              <a:t>2018-05-09</a:t>
+              <a:t>2018-05-10</a:t>
             </a:fld>
             <a:endParaRPr lang="ko-KR" altLang="en-US"/>
           </a:p>
@@ -1792,10 +1772,9 @@
           </a:lstStyle>
           <a:p>
             <a:r>
-              <a:rPr lang="ko-KR" altLang="en-US" smtClean="0"/>
+              <a:rPr lang="ko-KR" altLang="en-US"/>
               <a:t>마스터 제목 스타일 편집</a:t>
             </a:r>
-            <a:endParaRPr lang="ko-KR" altLang="en-US"/>
           </a:p>
         </p:txBody>
       </p:sp>
@@ -1858,7 +1837,7 @@
           <a:p>
             <a:pPr lvl="0"/>
             <a:r>
-              <a:rPr lang="ko-KR" altLang="en-US" smtClean="0"/>
+              <a:rPr lang="ko-KR" altLang="en-US"/>
               <a:t>마스터 텍스트 스타일을 편집합니다</a:t>
             </a:r>
           </a:p>
@@ -1914,38 +1893,37 @@
           <a:p>
             <a:pPr lvl="0"/>
             <a:r>
-              <a:rPr lang="ko-KR" altLang="en-US" smtClean="0"/>
+              <a:rPr lang="ko-KR" altLang="en-US"/>
               <a:t>마스터 텍스트 스타일을 편집합니다</a:t>
             </a:r>
           </a:p>
           <a:p>
             <a:pPr lvl="1"/>
             <a:r>
-              <a:rPr lang="ko-KR" altLang="en-US" smtClean="0"/>
+              <a:rPr lang="ko-KR" altLang="en-US"/>
               <a:t>둘째 수준</a:t>
             </a:r>
           </a:p>
           <a:p>
             <a:pPr lvl="2"/>
             <a:r>
-              <a:rPr lang="ko-KR" altLang="en-US" smtClean="0"/>
+              <a:rPr lang="ko-KR" altLang="en-US"/>
               <a:t>셋째 수준</a:t>
             </a:r>
           </a:p>
           <a:p>
             <a:pPr lvl="3"/>
             <a:r>
-              <a:rPr lang="ko-KR" altLang="en-US" smtClean="0"/>
+              <a:rPr lang="ko-KR" altLang="en-US"/>
               <a:t>넷째 수준</a:t>
             </a:r>
           </a:p>
           <a:p>
             <a:pPr lvl="4"/>
             <a:r>
-              <a:rPr lang="ko-KR" altLang="en-US" smtClean="0"/>
+              <a:rPr lang="ko-KR" altLang="en-US"/>
               <a:t>다섯째 수준</a:t>
             </a:r>
-            <a:endParaRPr lang="ko-KR" altLang="en-US"/>
           </a:p>
         </p:txBody>
       </p:sp>
@@ -2008,7 +1986,7 @@
           <a:p>
             <a:pPr lvl="0"/>
             <a:r>
-              <a:rPr lang="ko-KR" altLang="en-US" smtClean="0"/>
+              <a:rPr lang="ko-KR" altLang="en-US"/>
               <a:t>마스터 텍스트 스타일을 편집합니다</a:t>
             </a:r>
           </a:p>
@@ -2064,38 +2042,37 @@
           <a:p>
             <a:pPr lvl="0"/>
             <a:r>
-              <a:rPr lang="ko-KR" altLang="en-US" smtClean="0"/>
+              <a:rPr lang="ko-KR" altLang="en-US"/>
               <a:t>마스터 텍스트 스타일을 편집합니다</a:t>
             </a:r>
           </a:p>
           <a:p>
             <a:pPr lvl="1"/>
             <a:r>
-              <a:rPr lang="ko-KR" altLang="en-US" smtClean="0"/>
+              <a:rPr lang="ko-KR" altLang="en-US"/>
               <a:t>둘째 수준</a:t>
             </a:r>
           </a:p>
           <a:p>
             <a:pPr lvl="2"/>
             <a:r>
-              <a:rPr lang="ko-KR" altLang="en-US" smtClean="0"/>
+              <a:rPr lang="ko-KR" altLang="en-US"/>
               <a:t>셋째 수준</a:t>
             </a:r>
           </a:p>
           <a:p>
             <a:pPr lvl="3"/>
             <a:r>
-              <a:rPr lang="ko-KR" altLang="en-US" smtClean="0"/>
+              <a:rPr lang="ko-KR" altLang="en-US"/>
               <a:t>넷째 수준</a:t>
             </a:r>
           </a:p>
           <a:p>
             <a:pPr lvl="4"/>
             <a:r>
-              <a:rPr lang="ko-KR" altLang="en-US" smtClean="0"/>
+              <a:rPr lang="ko-KR" altLang="en-US"/>
               <a:t>다섯째 수준</a:t>
             </a:r>
-            <a:endParaRPr lang="ko-KR" altLang="en-US"/>
           </a:p>
         </p:txBody>
       </p:sp>
@@ -2116,7 +2093,7 @@
           <a:p>
             <a:fld id="{FB30EDBD-1C2D-4C1E-B459-B60219FAB484}" type="datetimeFigureOut">
               <a:rPr lang="ko-KR" altLang="en-US" smtClean="0"/>
-              <a:t>2018-05-09</a:t>
+              <a:t>2018-05-10</a:t>
             </a:fld>
             <a:endParaRPr lang="ko-KR" altLang="en-US"/>
           </a:p>
@@ -2205,10 +2182,9 @@
           <a:lstStyle/>
           <a:p>
             <a:r>
-              <a:rPr lang="ko-KR" altLang="en-US" smtClean="0"/>
+              <a:rPr lang="ko-KR" altLang="en-US"/>
               <a:t>마스터 제목 스타일 편집</a:t>
             </a:r>
-            <a:endParaRPr lang="ko-KR" altLang="en-US"/>
           </a:p>
         </p:txBody>
       </p:sp>
@@ -2229,7 +2205,7 @@
           <a:p>
             <a:fld id="{FB30EDBD-1C2D-4C1E-B459-B60219FAB484}" type="datetimeFigureOut">
               <a:rPr lang="ko-KR" altLang="en-US" smtClean="0"/>
-              <a:t>2018-05-09</a:t>
+              <a:t>2018-05-10</a:t>
             </a:fld>
             <a:endParaRPr lang="ko-KR" altLang="en-US"/>
           </a:p>
@@ -2319,7 +2295,7 @@
           <a:p>
             <a:fld id="{FB30EDBD-1C2D-4C1E-B459-B60219FAB484}" type="datetimeFigureOut">
               <a:rPr lang="ko-KR" altLang="en-US" smtClean="0"/>
-              <a:t>2018-05-09</a:t>
+              <a:t>2018-05-10</a:t>
             </a:fld>
             <a:endParaRPr lang="ko-KR" altLang="en-US"/>
           </a:p>
@@ -2417,10 +2393,9 @@
           </a:lstStyle>
           <a:p>
             <a:r>
-              <a:rPr lang="ko-KR" altLang="en-US" smtClean="0"/>
+              <a:rPr lang="ko-KR" altLang="en-US"/>
               <a:t>마스터 제목 스타일 편집</a:t>
             </a:r>
-            <a:endParaRPr lang="ko-KR" altLang="en-US"/>
           </a:p>
         </p:txBody>
       </p:sp>
@@ -2474,38 +2449,37 @@
           <a:p>
             <a:pPr lvl="0"/>
             <a:r>
-              <a:rPr lang="ko-KR" altLang="en-US" smtClean="0"/>
+              <a:rPr lang="ko-KR" altLang="en-US"/>
               <a:t>마스터 텍스트 스타일을 편집합니다</a:t>
             </a:r>
           </a:p>
           <a:p>
             <a:pPr lvl="1"/>
             <a:r>
-              <a:rPr lang="ko-KR" altLang="en-US" smtClean="0"/>
+              <a:rPr lang="ko-KR" altLang="en-US"/>
               <a:t>둘째 수준</a:t>
             </a:r>
           </a:p>
           <a:p>
             <a:pPr lvl="2"/>
             <a:r>
-              <a:rPr lang="ko-KR" altLang="en-US" smtClean="0"/>
+              <a:rPr lang="ko-KR" altLang="en-US"/>
               <a:t>셋째 수준</a:t>
             </a:r>
           </a:p>
           <a:p>
             <a:pPr lvl="3"/>
             <a:r>
-              <a:rPr lang="ko-KR" altLang="en-US" smtClean="0"/>
+              <a:rPr lang="ko-KR" altLang="en-US"/>
               <a:t>넷째 수준</a:t>
             </a:r>
           </a:p>
           <a:p>
             <a:pPr lvl="4"/>
             <a:r>
-              <a:rPr lang="ko-KR" altLang="en-US" smtClean="0"/>
+              <a:rPr lang="ko-KR" altLang="en-US"/>
               <a:t>다섯째 수준</a:t>
             </a:r>
-            <a:endParaRPr lang="ko-KR" altLang="en-US"/>
           </a:p>
         </p:txBody>
       </p:sp>
@@ -2568,7 +2542,7 @@
           <a:p>
             <a:pPr lvl="0"/>
             <a:r>
-              <a:rPr lang="ko-KR" altLang="en-US" smtClean="0"/>
+              <a:rPr lang="ko-KR" altLang="en-US"/>
               <a:t>마스터 텍스트 스타일을 편집합니다</a:t>
             </a:r>
           </a:p>
@@ -2591,7 +2565,7 @@
           <a:p>
             <a:fld id="{FB30EDBD-1C2D-4C1E-B459-B60219FAB484}" type="datetimeFigureOut">
               <a:rPr lang="ko-KR" altLang="en-US" smtClean="0"/>
-              <a:t>2018-05-09</a:t>
+              <a:t>2018-05-10</a:t>
             </a:fld>
             <a:endParaRPr lang="ko-KR" altLang="en-US"/>
           </a:p>
@@ -2689,10 +2663,9 @@
           </a:lstStyle>
           <a:p>
             <a:r>
-              <a:rPr lang="ko-KR" altLang="en-US" smtClean="0"/>
+              <a:rPr lang="ko-KR" altLang="en-US"/>
               <a:t>마스터 제목 스타일 편집</a:t>
             </a:r>
-            <a:endParaRPr lang="ko-KR" altLang="en-US"/>
           </a:p>
         </p:txBody>
       </p:sp>
@@ -2816,7 +2789,7 @@
           <a:p>
             <a:pPr lvl="0"/>
             <a:r>
-              <a:rPr lang="ko-KR" altLang="en-US" smtClean="0"/>
+              <a:rPr lang="ko-KR" altLang="en-US"/>
               <a:t>마스터 텍스트 스타일을 편집합니다</a:t>
             </a:r>
           </a:p>
@@ -2839,7 +2812,7 @@
           <a:p>
             <a:fld id="{FB30EDBD-1C2D-4C1E-B459-B60219FAB484}" type="datetimeFigureOut">
               <a:rPr lang="ko-KR" altLang="en-US" smtClean="0"/>
-              <a:t>2018-05-09</a:t>
+              <a:t>2018-05-10</a:t>
             </a:fld>
             <a:endParaRPr lang="ko-KR" altLang="en-US"/>
           </a:p>
@@ -2943,10 +2916,9 @@
           <a:lstStyle/>
           <a:p>
             <a:r>
-              <a:rPr lang="ko-KR" altLang="en-US" smtClean="0"/>
+              <a:rPr lang="ko-KR" altLang="en-US"/>
               <a:t>마스터 제목 스타일 편집</a:t>
             </a:r>
-            <a:endParaRPr lang="ko-KR" altLang="en-US"/>
           </a:p>
         </p:txBody>
       </p:sp>
@@ -2977,38 +2949,37 @@
           <a:p>
             <a:pPr lvl="0"/>
             <a:r>
-              <a:rPr lang="ko-KR" altLang="en-US" smtClean="0"/>
+              <a:rPr lang="ko-KR" altLang="en-US"/>
               <a:t>마스터 텍스트 스타일을 편집합니다</a:t>
             </a:r>
           </a:p>
           <a:p>
             <a:pPr lvl="1"/>
             <a:r>
-              <a:rPr lang="ko-KR" altLang="en-US" smtClean="0"/>
+              <a:rPr lang="ko-KR" altLang="en-US"/>
               <a:t>둘째 수준</a:t>
             </a:r>
           </a:p>
           <a:p>
             <a:pPr lvl="2"/>
             <a:r>
-              <a:rPr lang="ko-KR" altLang="en-US" smtClean="0"/>
+              <a:rPr lang="ko-KR" altLang="en-US"/>
               <a:t>셋째 수준</a:t>
             </a:r>
           </a:p>
           <a:p>
             <a:pPr lvl="3"/>
             <a:r>
-              <a:rPr lang="ko-KR" altLang="en-US" smtClean="0"/>
+              <a:rPr lang="ko-KR" altLang="en-US"/>
               <a:t>넷째 수준</a:t>
             </a:r>
           </a:p>
           <a:p>
             <a:pPr lvl="4"/>
             <a:r>
-              <a:rPr lang="ko-KR" altLang="en-US" smtClean="0"/>
+              <a:rPr lang="ko-KR" altLang="en-US"/>
               <a:t>다섯째 수준</a:t>
             </a:r>
-            <a:endParaRPr lang="ko-KR" altLang="en-US"/>
           </a:p>
         </p:txBody>
       </p:sp>
@@ -3047,7 +3018,7 @@
           <a:p>
             <a:fld id="{FB30EDBD-1C2D-4C1E-B459-B60219FAB484}" type="datetimeFigureOut">
               <a:rPr lang="ko-KR" altLang="en-US" smtClean="0"/>
-              <a:t>2018-05-09</a:t>
+              <a:t>2018-05-10</a:t>
             </a:fld>
             <a:endParaRPr lang="ko-KR" altLang="en-US"/>
           </a:p>
@@ -3420,13 +3391,15 @@
       <p:cxnSp>
         <p:nvCxnSpPr>
           <p:cNvPr id="3" name="직선 연결선 2"/>
-          <p:cNvCxnSpPr/>
+          <p:cNvCxnSpPr>
+            <a:cxnSpLocks/>
+          </p:cNvCxnSpPr>
           <p:nvPr/>
         </p:nvCxnSpPr>
         <p:spPr>
           <a:xfrm>
             <a:off x="2554008" y="1149071"/>
-            <a:ext cx="0" cy="1926735"/>
+            <a:ext cx="0" cy="1710711"/>
           </a:xfrm>
           <a:prstGeom prst="line">
             <a:avLst/>
@@ -3476,7 +3449,7 @@
           <a:p>
             <a:pPr algn="ctr"/>
             <a:r>
-              <a:rPr lang="en-US" altLang="ko-KR" dirty="0" smtClean="0"/>
+              <a:rPr lang="en-US" altLang="ko-KR" dirty="0"/>
               <a:t>Client</a:t>
             </a:r>
             <a:endParaRPr lang="ko-KR" altLang="en-US" dirty="0"/>
@@ -3486,13 +3459,15 @@
       <p:cxnSp>
         <p:nvCxnSpPr>
           <p:cNvPr id="5" name="직선 연결선 4"/>
-          <p:cNvCxnSpPr/>
+          <p:cNvCxnSpPr>
+            <a:cxnSpLocks/>
+          </p:cNvCxnSpPr>
           <p:nvPr/>
         </p:nvCxnSpPr>
         <p:spPr>
           <a:xfrm>
             <a:off x="6547731" y="1149071"/>
-            <a:ext cx="0" cy="1926735"/>
+            <a:ext cx="0" cy="1710711"/>
           </a:xfrm>
           <a:prstGeom prst="line">
             <a:avLst/>
@@ -3542,7 +3517,7 @@
           <a:p>
             <a:pPr algn="ctr"/>
             <a:r>
-              <a:rPr lang="en-US" altLang="ko-KR" dirty="0" smtClean="0"/>
+              <a:rPr lang="en-US" altLang="ko-KR" dirty="0"/>
               <a:t>Server</a:t>
             </a:r>
             <a:endParaRPr lang="ko-KR" altLang="en-US" dirty="0"/>
@@ -3610,21 +3585,16 @@
           <a:p>
             <a:r>
               <a:rPr lang="en-US" altLang="ko-KR" sz="1100" dirty="0"/>
-              <a:t>GET </a:t>
-            </a:r>
-            <a:r>
-              <a:rPr lang="en-US" altLang="ko-KR" sz="1100" dirty="0" smtClean="0"/>
-              <a:t>/</a:t>
-            </a:r>
-            <a:r>
-              <a:rPr lang="en-US" altLang="ko-KR" sz="1100" dirty="0" err="1" smtClean="0"/>
+              <a:t>GET /</a:t>
+            </a:r>
+            <a:r>
+              <a:rPr lang="en-US" altLang="ko-KR" sz="1100" dirty="0" err="1"/>
               <a:t>index.html</a:t>
             </a:r>
             <a:r>
-              <a:rPr lang="en-US" altLang="ko-KR" sz="1100" dirty="0" smtClean="0"/>
+              <a:rPr lang="en-US" altLang="ko-KR" sz="1100" dirty="0"/>
               <a:t> HTTP/1.1</a:t>
             </a:r>
-            <a:endParaRPr lang="en-US" altLang="ko-KR" sz="1100" dirty="0"/>
           </a:p>
         </p:txBody>
       </p:sp>
@@ -3636,7 +3606,7 @@
         </p:nvCxnSpPr>
         <p:spPr>
           <a:xfrm flipH="1" flipV="1">
-            <a:off x="2575139" y="2188205"/>
+            <a:off x="2575139" y="2154739"/>
             <a:ext cx="3971711" cy="1002"/>
           </a:xfrm>
           <a:prstGeom prst="line">
@@ -3673,7 +3643,7 @@
         </p:nvSpPr>
         <p:spPr>
           <a:xfrm>
-            <a:off x="2873546" y="1597104"/>
+            <a:off x="2873546" y="1563638"/>
             <a:ext cx="3354638" cy="577081"/>
           </a:xfrm>
           <a:prstGeom prst="rect">
@@ -3688,49 +3658,39 @@
           <a:lstStyle/>
           <a:p>
             <a:r>
-              <a:rPr lang="en-US" altLang="ko-KR" sz="1100" dirty="0" smtClean="0"/>
+              <a:rPr lang="en-US" altLang="ko-KR" sz="1100" dirty="0"/>
               <a:t>HTTP/1.1 200 OK</a:t>
             </a:r>
-            <a:endParaRPr lang="en-US" altLang="ko-KR" sz="1100" dirty="0"/>
-          </a:p>
-          <a:p>
-            <a:r>
-              <a:rPr lang="en-US" altLang="ko-KR" sz="1100" dirty="0" smtClean="0"/>
+          </a:p>
+          <a:p>
+            <a:r>
+              <a:rPr lang="en-US" altLang="ko-KR" sz="1100" dirty="0"/>
               <a:t>Set-Cookie: name=</a:t>
             </a:r>
             <a:r>
-              <a:rPr lang="en-US" altLang="ko-KR" sz="1100" dirty="0" err="1" smtClean="0"/>
+              <a:rPr lang="en-US" altLang="ko-KR" sz="1100" dirty="0" err="1"/>
               <a:t>supsup</a:t>
             </a:r>
             <a:r>
-              <a:rPr lang="en-US" altLang="ko-KR" sz="1100" dirty="0" smtClean="0"/>
-              <a:t>; </a:t>
-            </a:r>
-            <a:r>
               <a:rPr lang="en-US" altLang="ko-KR" sz="1100" dirty="0"/>
-              <a:t>Expires=Wed, 21 Oct </a:t>
-            </a:r>
-            <a:r>
-              <a:rPr lang="en-US" altLang="ko-KR" sz="1100" dirty="0" smtClean="0"/>
-              <a:t>2018 09:99:00 </a:t>
+              <a:t>; Expires=Wed, 21 Oct </a:t>
+            </a:r>
+            <a:r>
+              <a:rPr lang="en-US" altLang="ko-KR" sz="1100"/>
+              <a:t>2018 09:00:00 </a:t>
             </a:r>
             <a:r>
               <a:rPr lang="en-US" altLang="ko-KR" sz="1100" dirty="0"/>
-              <a:t>GMT</a:t>
-            </a:r>
-            <a:r>
-              <a:rPr lang="en-US" altLang="ko-KR" sz="1100" dirty="0" smtClean="0"/>
-              <a:t>; Domain=</a:t>
-            </a:r>
-            <a:r>
-              <a:rPr lang="en-US" altLang="ko-KR" sz="1100" dirty="0" err="1" smtClean="0"/>
+              <a:t>GMT; Domain=</a:t>
+            </a:r>
+            <a:r>
+              <a:rPr lang="en-US" altLang="ko-KR" sz="1100" dirty="0" err="1"/>
               <a:t>ssup2.com</a:t>
             </a:r>
             <a:r>
-              <a:rPr lang="en-US" altLang="ko-KR" sz="1100" dirty="0" smtClean="0"/>
+              <a:rPr lang="en-US" altLang="ko-KR" sz="1100" dirty="0"/>
               <a:t>; Path=/</a:t>
             </a:r>
-            <a:endParaRPr lang="en-US" altLang="ko-KR" sz="1100" dirty="0" smtClean="0"/>
           </a:p>
         </p:txBody>
       </p:sp>
@@ -3771,7 +3731,7 @@
           </a:lstStyle>
           <a:p>
             <a:r>
-              <a:rPr lang="en-US" altLang="ko-KR" dirty="0" smtClean="0"/>
+              <a:rPr lang="en-US" altLang="ko-KR" dirty="0"/>
               <a:t>Cookie</a:t>
             </a:r>
             <a:endParaRPr lang="ko-KR" altLang="en-US" dirty="0"/>
@@ -3786,7 +3746,7 @@
         </p:nvCxnSpPr>
         <p:spPr>
           <a:xfrm>
-            <a:off x="2554008" y="2756478"/>
+            <a:off x="2554008" y="2684470"/>
             <a:ext cx="3993722" cy="0"/>
           </a:xfrm>
           <a:prstGeom prst="line">
@@ -3823,7 +3783,7 @@
         </p:nvSpPr>
         <p:spPr>
           <a:xfrm>
-            <a:off x="2883675" y="2355726"/>
+            <a:off x="2883675" y="2283718"/>
             <a:ext cx="3354637" cy="407804"/>
           </a:xfrm>
           <a:prstGeom prst="rect">
@@ -3839,32 +3799,24 @@
           <a:p>
             <a:r>
               <a:rPr lang="en-US" altLang="ko-KR" sz="1100" dirty="0"/>
-              <a:t>GET </a:t>
-            </a:r>
-            <a:r>
-              <a:rPr lang="en-US" altLang="ko-KR" sz="1100" dirty="0" smtClean="0"/>
-              <a:t>/home/</a:t>
-            </a:r>
-            <a:r>
-              <a:rPr lang="en-US" altLang="ko-KR" sz="1100" dirty="0" err="1" smtClean="0"/>
-              <a:t>address</a:t>
-            </a:r>
-            <a:r>
-              <a:rPr lang="en-US" altLang="ko-KR" sz="1100" dirty="0" err="1" smtClean="0"/>
-              <a:t>.html</a:t>
-            </a:r>
-            <a:r>
-              <a:rPr lang="en-US" altLang="ko-KR" sz="1100" dirty="0" smtClean="0"/>
+              <a:t>GET /home/</a:t>
+            </a:r>
+            <a:r>
+              <a:rPr lang="en-US" altLang="ko-KR" sz="1100" dirty="0" err="1"/>
+              <a:t>address.html</a:t>
+            </a:r>
+            <a:r>
+              <a:rPr lang="en-US" altLang="ko-KR" sz="1100" dirty="0"/>
               <a:t> HTTP/1.1</a:t>
             </a:r>
           </a:p>
           <a:p>
             <a:r>
-              <a:rPr lang="en-US" altLang="ko-KR" sz="1100" dirty="0" smtClean="0"/>
+              <a:rPr lang="en-US" altLang="ko-KR" sz="1100" dirty="0"/>
               <a:t>Cookie: name=</a:t>
             </a:r>
             <a:r>
-              <a:rPr lang="en-US" altLang="ko-KR" sz="1100" dirty="0" err="1" smtClean="0"/>
+              <a:rPr lang="en-US" altLang="ko-KR" sz="1100" dirty="0" err="1"/>
               <a:t>supsup</a:t>
             </a:r>
             <a:endParaRPr lang="en-US" altLang="ko-KR" sz="1100" dirty="0"/>
@@ -3904,13 +3856,15 @@
       <p:cxnSp>
         <p:nvCxnSpPr>
           <p:cNvPr id="3" name="직선 연결선 2"/>
-          <p:cNvCxnSpPr/>
+          <p:cNvCxnSpPr>
+            <a:cxnSpLocks/>
+          </p:cNvCxnSpPr>
           <p:nvPr/>
         </p:nvCxnSpPr>
         <p:spPr>
           <a:xfrm>
             <a:off x="2554008" y="1149071"/>
-            <a:ext cx="0" cy="1638703"/>
+            <a:ext cx="0" cy="1566695"/>
           </a:xfrm>
           <a:prstGeom prst="line">
             <a:avLst/>
@@ -3960,7 +3914,7 @@
           <a:p>
             <a:pPr algn="ctr"/>
             <a:r>
-              <a:rPr lang="en-US" altLang="ko-KR" dirty="0" smtClean="0"/>
+              <a:rPr lang="en-US" altLang="ko-KR" dirty="0"/>
               <a:t>Client</a:t>
             </a:r>
             <a:endParaRPr lang="ko-KR" altLang="en-US" dirty="0"/>
@@ -3970,13 +3924,15 @@
       <p:cxnSp>
         <p:nvCxnSpPr>
           <p:cNvPr id="5" name="직선 연결선 4"/>
-          <p:cNvCxnSpPr/>
+          <p:cNvCxnSpPr>
+            <a:cxnSpLocks/>
+          </p:cNvCxnSpPr>
           <p:nvPr/>
         </p:nvCxnSpPr>
         <p:spPr>
           <a:xfrm>
             <a:off x="6547731" y="1149071"/>
-            <a:ext cx="0" cy="1638703"/>
+            <a:ext cx="0" cy="1566695"/>
           </a:xfrm>
           <a:prstGeom prst="line">
             <a:avLst/>
@@ -4026,7 +3982,7 @@
           <a:p>
             <a:pPr algn="ctr"/>
             <a:r>
-              <a:rPr lang="en-US" altLang="ko-KR" dirty="0" smtClean="0"/>
+              <a:rPr lang="en-US" altLang="ko-KR" dirty="0"/>
               <a:t>Server</a:t>
             </a:r>
             <a:endParaRPr lang="ko-KR" altLang="en-US" dirty="0"/>
@@ -4094,21 +4050,16 @@
           <a:p>
             <a:r>
               <a:rPr lang="en-US" altLang="ko-KR" sz="1100" dirty="0"/>
-              <a:t>GET </a:t>
-            </a:r>
-            <a:r>
-              <a:rPr lang="en-US" altLang="ko-KR" sz="1100" dirty="0" smtClean="0"/>
-              <a:t>/</a:t>
-            </a:r>
-            <a:r>
-              <a:rPr lang="en-US" altLang="ko-KR" sz="1100" dirty="0" err="1" smtClean="0"/>
+              <a:t>GET /</a:t>
+            </a:r>
+            <a:r>
+              <a:rPr lang="en-US" altLang="ko-KR" sz="1100" dirty="0" err="1"/>
               <a:t>index.html</a:t>
             </a:r>
             <a:r>
-              <a:rPr lang="en-US" altLang="ko-KR" sz="1100" dirty="0" smtClean="0"/>
+              <a:rPr lang="en-US" altLang="ko-KR" sz="1100" dirty="0"/>
               <a:t> HTTP/1.1</a:t>
             </a:r>
-            <a:endParaRPr lang="en-US" altLang="ko-KR" sz="1100" dirty="0"/>
           </a:p>
         </p:txBody>
       </p:sp>
@@ -4172,30 +4123,29 @@
           <a:lstStyle/>
           <a:p>
             <a:r>
-              <a:rPr lang="en-US" altLang="ko-KR" sz="1100" dirty="0" smtClean="0"/>
+              <a:rPr lang="en-US" altLang="ko-KR" sz="1100" dirty="0"/>
               <a:t>HTTP/1.1 200 OK</a:t>
             </a:r>
-            <a:endParaRPr lang="en-US" altLang="ko-KR" sz="1100" dirty="0"/>
-          </a:p>
-          <a:p>
-            <a:r>
-              <a:rPr lang="en-US" altLang="ko-KR" sz="1100" dirty="0" smtClean="0"/>
+          </a:p>
+          <a:p>
+            <a:r>
+              <a:rPr lang="en-US" altLang="ko-KR" sz="1100" dirty="0"/>
               <a:t>Set-Cookie: </a:t>
             </a:r>
             <a:r>
-              <a:rPr lang="en-US" altLang="ko-KR" sz="1100" dirty="0" err="1" smtClean="0"/>
+              <a:rPr lang="en-US" altLang="ko-KR" sz="1100" dirty="0" err="1"/>
               <a:t>JSESSIONID</a:t>
             </a:r>
             <a:r>
-              <a:rPr lang="en-US" altLang="ko-KR" sz="1100" dirty="0" smtClean="0"/>
+              <a:rPr lang="en-US" altLang="ko-KR" sz="1100" dirty="0"/>
               <a:t>=</a:t>
             </a:r>
             <a:r>
-              <a:rPr lang="en-US" altLang="ko-KR" sz="1100" dirty="0" err="1" smtClean="0"/>
+              <a:rPr lang="en-US" altLang="ko-KR" sz="1100" dirty="0" err="1"/>
               <a:t>ad41gGb1UE70TxB</a:t>
             </a:r>
             <a:r>
-              <a:rPr lang="en-US" altLang="ko-KR" sz="1100" dirty="0" smtClean="0"/>
+              <a:rPr lang="en-US" altLang="ko-KR" sz="1100" dirty="0"/>
               <a:t>…</a:t>
             </a:r>
           </a:p>
@@ -4238,7 +4188,7 @@
           </a:lstStyle>
           <a:p>
             <a:r>
-              <a:rPr lang="en-US" altLang="ko-KR" dirty="0" smtClean="0"/>
+              <a:rPr lang="en-US" altLang="ko-KR" dirty="0"/>
               <a:t>Session</a:t>
             </a:r>
             <a:endParaRPr lang="ko-KR" altLang="en-US" dirty="0"/>
@@ -4253,7 +4203,7 @@
         </p:nvCxnSpPr>
         <p:spPr>
           <a:xfrm>
-            <a:off x="2554008" y="2540454"/>
+            <a:off x="2554008" y="2468446"/>
             <a:ext cx="3993722" cy="0"/>
           </a:xfrm>
           <a:prstGeom prst="line">
@@ -4290,7 +4240,7 @@
         </p:nvSpPr>
         <p:spPr>
           <a:xfrm>
-            <a:off x="2883675" y="2139702"/>
+            <a:off x="2883675" y="2067694"/>
             <a:ext cx="3354637" cy="407804"/>
           </a:xfrm>
           <a:prstGeom prst="rect">
@@ -4306,36 +4256,28 @@
           <a:p>
             <a:r>
               <a:rPr lang="en-US" altLang="ko-KR" sz="1100" dirty="0"/>
-              <a:t>GET </a:t>
-            </a:r>
-            <a:r>
-              <a:rPr lang="en-US" altLang="ko-KR" sz="1100" dirty="0" smtClean="0"/>
-              <a:t>/home/</a:t>
-            </a:r>
-            <a:r>
-              <a:rPr lang="en-US" altLang="ko-KR" sz="1100" dirty="0" err="1" smtClean="0"/>
-              <a:t>address</a:t>
-            </a:r>
-            <a:r>
-              <a:rPr lang="en-US" altLang="ko-KR" sz="1100" dirty="0" err="1" smtClean="0"/>
-              <a:t>.html</a:t>
-            </a:r>
-            <a:r>
-              <a:rPr lang="en-US" altLang="ko-KR" sz="1100" dirty="0" smtClean="0"/>
+              <a:t>GET /home/</a:t>
+            </a:r>
+            <a:r>
+              <a:rPr lang="en-US" altLang="ko-KR" sz="1100" dirty="0" err="1"/>
+              <a:t>address.html</a:t>
+            </a:r>
+            <a:r>
+              <a:rPr lang="en-US" altLang="ko-KR" sz="1100" dirty="0"/>
               <a:t> HTTP/1.1</a:t>
             </a:r>
           </a:p>
           <a:p>
             <a:r>
-              <a:rPr lang="en-US" altLang="ko-KR" sz="1100" dirty="0" smtClean="0"/>
+              <a:rPr lang="en-US" altLang="ko-KR" sz="1100" dirty="0"/>
               <a:t>Cookie: </a:t>
             </a:r>
             <a:r>
-              <a:rPr lang="en-US" altLang="ko-KR" sz="1100" dirty="0" err="1" smtClean="0"/>
+              <a:rPr lang="en-US" altLang="ko-KR" sz="1100" dirty="0" err="1"/>
               <a:t>JSESSIONID</a:t>
             </a:r>
             <a:r>
-              <a:rPr lang="en-US" altLang="ko-KR" sz="1100" dirty="0" smtClean="0"/>
+              <a:rPr lang="en-US" altLang="ko-KR" sz="1100" dirty="0"/>
               <a:t>=</a:t>
             </a:r>
             <a:r>
@@ -4343,10 +4285,9 @@
               <a:t>ad41gGb1UE70TxB</a:t>
             </a:r>
             <a:r>
-              <a:rPr lang="en-US" altLang="ko-KR" sz="1100" dirty="0" smtClean="0"/>
+              <a:rPr lang="en-US" altLang="ko-KR" sz="1100" dirty="0"/>
               <a:t>…</a:t>
             </a:r>
-            <a:endParaRPr lang="en-US" altLang="ko-KR" sz="1100" dirty="0"/>
           </a:p>
         </p:txBody>
       </p:sp>

</xml_diff>